<commit_message>
【spring security授权】--- spring security授权核心源码解读
</commit_message>
<xml_diff>
--- a/nrsc-security-core/src/main/resources/docs/表单登陆认证、spring-security原理图.pptx
+++ b/nrsc-security-core/src/main/resources/docs/表单登陆认证、spring-security原理图.pptx
@@ -6,7 +6,7 @@
     <p:sldMasterId id="2147483660" r:id="rId3"/>
   </p:sldMasterIdLst>
   <p:notesMasterIdLst>
-    <p:notesMasterId r:id="rId15"/>
+    <p:notesMasterId r:id="rId17"/>
   </p:notesMasterIdLst>
   <p:sldIdLst>
     <p:sldId id="258" r:id="rId4"/>
@@ -20,6 +20,8 @@
     <p:sldId id="272" r:id="rId12"/>
     <p:sldId id="273" r:id="rId13"/>
     <p:sldId id="274" r:id="rId14"/>
+    <p:sldId id="275" r:id="rId15"/>
+    <p:sldId id="276" r:id="rId16"/>
   </p:sldIdLst>
   <p:sldSz cx="12192000" cy="6858000"/>
   <p:notesSz cx="6858000" cy="9144000"/>
@@ -7169,6 +7171,7 @@
           <a:bodyPr vertOverflow="overflow" horzOverflow="overflow" vert="horz" wrap="square" numCol="1" spcCol="0" rtlCol="0" fromWordArt="0" anchor="t" anchorCtr="0" forceAA="0" compatLnSpc="1">
             <a:noAutofit/>
           </a:bodyPr>
+          <a:lstStyle/>
           <a:p>
             <a:pPr lvl="0" algn="ctr">
               <a:buClrTx/>
@@ -7255,6 +7258,7 @@
         </p:style>
         <p:txBody>
           <a:bodyPr rtlCol="0" anchor="ctr"/>
+          <a:lstStyle/>
           <a:p>
             <a:pPr algn="ctr"/>
             <a:r>
@@ -7300,6 +7304,7 @@
         </p:style>
         <p:txBody>
           <a:bodyPr rtlCol="0" anchor="ctr"/>
+          <a:lstStyle/>
           <a:p>
             <a:pPr algn="ctr"/>
             <a:r>
@@ -7360,6 +7365,7 @@
           <a:bodyPr vertOverflow="overflow" horzOverflow="overflow" vert="horz" wrap="square" numCol="1" spcCol="0" rtlCol="0" fromWordArt="0" anchor="t" anchorCtr="0" forceAA="0" compatLnSpc="1">
             <a:noAutofit/>
           </a:bodyPr>
+          <a:lstStyle/>
           <a:p>
             <a:pPr lvl="0" algn="ctr">
               <a:buClrTx/>
@@ -7373,16 +7379,7 @@
                 </a:solidFill>
                 <a:sym typeface="+mn-ea"/>
               </a:rPr>
-              <a:t>SpringSecurity</a:t>
-            </a:r>
-            <a:r>
-              <a:rPr lang="zh-CN" altLang="zh-CN" b="1" dirty="0">
-                <a:solidFill>
-                  <a:schemeClr val="tx1"/>
-                </a:solidFill>
-                <a:sym typeface="+mn-ea"/>
-              </a:rPr>
-              <a:t>过滤器链</a:t>
+              <a:t>SpringSecurity过滤器链</a:t>
             </a:r>
             <a:endParaRPr lang="zh-CN" altLang="zh-CN" b="1" dirty="0">
               <a:solidFill>
@@ -7424,6 +7421,7 @@
         </p:style>
         <p:txBody>
           <a:bodyPr rtlCol="0" anchor="ctr"/>
+          <a:lstStyle/>
           <a:p>
             <a:pPr algn="ctr"/>
             <a:r>
@@ -7497,6 +7495,7 @@
         </p:style>
         <p:txBody>
           <a:bodyPr rtlCol="0" anchor="ctr"/>
+          <a:lstStyle/>
           <a:p>
             <a:pPr algn="ctr"/>
             <a:r>
@@ -7589,6 +7588,7 @@
         </p:style>
         <p:txBody>
           <a:bodyPr rtlCol="0" anchor="ctr"/>
+          <a:lstStyle/>
           <a:p>
             <a:pPr algn="ctr"/>
             <a:r>
@@ -7649,6 +7649,7 @@
         </p:style>
         <p:txBody>
           <a:bodyPr rtlCol="0" anchor="ctr"/>
+          <a:lstStyle/>
           <a:p>
             <a:pPr algn="ctr"/>
             <a:endParaRPr lang="zh-CN" altLang="en-US"/>
@@ -7911,6 +7912,7 @@
           <a:bodyPr vertOverflow="overflow" horzOverflow="overflow" vert="horz" wrap="square" numCol="1" spcCol="0" rtlCol="0" fromWordArt="0" anchor="t" anchorCtr="0" forceAA="0" compatLnSpc="1">
             <a:noAutofit/>
           </a:bodyPr>
+          <a:lstStyle/>
           <a:p>
             <a:pPr lvl="0" algn="ctr">
               <a:buClrTx/>
@@ -7997,6 +7999,7 @@
         </p:style>
         <p:txBody>
           <a:bodyPr rtlCol="0" anchor="ctr"/>
+          <a:lstStyle/>
           <a:p>
             <a:pPr algn="ctr"/>
             <a:r>
@@ -8038,6 +8041,7 @@
         </p:style>
         <p:txBody>
           <a:bodyPr rtlCol="0" anchor="ctr"/>
+          <a:lstStyle/>
           <a:p>
             <a:pPr algn="ctr"/>
             <a:r>
@@ -8098,6 +8102,7 @@
           <a:bodyPr vertOverflow="overflow" horzOverflow="overflow" vert="horz" wrap="square" numCol="1" spcCol="0" rtlCol="0" fromWordArt="0" anchor="t" anchorCtr="0" forceAA="0" compatLnSpc="1">
             <a:noAutofit/>
           </a:bodyPr>
+          <a:lstStyle/>
           <a:p>
             <a:pPr lvl="0" algn="ctr">
               <a:buClrTx/>
@@ -8111,16 +8116,7 @@
                 </a:solidFill>
                 <a:sym typeface="+mn-ea"/>
               </a:rPr>
-              <a:t>SpringSecurity</a:t>
-            </a:r>
-            <a:r>
-              <a:rPr lang="zh-CN" altLang="zh-CN" b="1" dirty="0">
-                <a:solidFill>
-                  <a:schemeClr val="tx1"/>
-                </a:solidFill>
-                <a:sym typeface="+mn-ea"/>
-              </a:rPr>
-              <a:t>过滤器链</a:t>
+              <a:t>SpringSecurity过滤器链</a:t>
             </a:r>
             <a:endParaRPr lang="zh-CN" altLang="zh-CN" b="1" dirty="0">
               <a:solidFill>
@@ -8162,6 +8158,7 @@
         </p:style>
         <p:txBody>
           <a:bodyPr rtlCol="0" anchor="ctr"/>
+          <a:lstStyle/>
           <a:p>
             <a:pPr algn="ctr"/>
             <a:r>
@@ -8235,6 +8232,7 @@
         </p:style>
         <p:txBody>
           <a:bodyPr rtlCol="0" anchor="ctr"/>
+          <a:lstStyle/>
           <a:p>
             <a:pPr algn="ctr"/>
             <a:r>
@@ -8327,6 +8325,7 @@
         </p:style>
         <p:txBody>
           <a:bodyPr rtlCol="0" anchor="ctr"/>
+          <a:lstStyle/>
           <a:p>
             <a:pPr algn="ctr"/>
             <a:r>
@@ -8387,9 +8386,1440 @@
         </p:style>
         <p:txBody>
           <a:bodyPr rtlCol="0" anchor="ctr"/>
+          <a:lstStyle/>
           <a:p>
             <a:pPr algn="ctr"/>
             <a:endParaRPr lang="zh-CN" altLang="en-US"/>
+          </a:p>
+        </p:txBody>
+      </p:sp>
+    </p:spTree>
+  </p:cSld>
+  <p:clrMapOvr>
+    <a:masterClrMapping/>
+  </p:clrMapOvr>
+</p:sld>
+</file>
+
+<file path=ppt/slides/slide12.xml><?xml version="1.0" encoding="utf-8"?>
+<p:sld xmlns:a="http://schemas.openxmlformats.org/drawingml/2006/main" xmlns:r="http://schemas.openxmlformats.org/officeDocument/2006/relationships" xmlns:p="http://schemas.openxmlformats.org/presentationml/2006/main">
+  <p:cSld>
+    <p:spTree>
+      <p:nvGrpSpPr>
+        <p:cNvPr id="1" name=""/>
+        <p:cNvGrpSpPr/>
+        <p:nvPr/>
+      </p:nvGrpSpPr>
+      <p:grpSpPr>
+        <a:xfrm>
+          <a:off x="0" y="0"/>
+          <a:ext cx="0" cy="0"/>
+          <a:chOff x="0" y="0"/>
+          <a:chExt cx="0" cy="0"/>
+        </a:xfrm>
+      </p:grpSpPr>
+      <p:pic>
+        <p:nvPicPr>
+          <p:cNvPr id="5" name="图片 4"/>
+          <p:cNvPicPr>
+            <a:picLocks noChangeAspect="1"/>
+          </p:cNvPicPr>
+          <p:nvPr/>
+        </p:nvPicPr>
+        <p:blipFill>
+          <a:blip r:embed="rId1"/>
+          <a:stretch>
+            <a:fillRect/>
+          </a:stretch>
+        </p:blipFill>
+        <p:spPr>
+          <a:xfrm>
+            <a:off x="243795" y="780054"/>
+            <a:ext cx="11082079" cy="5684755"/>
+          </a:xfrm>
+          <a:prstGeom prst="rect">
+            <a:avLst/>
+          </a:prstGeom>
+        </p:spPr>
+      </p:pic>
+      <p:sp>
+        <p:nvSpPr>
+          <p:cNvPr id="6" name="矩形 5"/>
+          <p:cNvSpPr/>
+          <p:nvPr/>
+        </p:nvSpPr>
+        <p:spPr>
+          <a:xfrm>
+            <a:off x="421005" y="1397635"/>
+            <a:ext cx="2955925" cy="2397125"/>
+          </a:xfrm>
+          <a:prstGeom prst="rect">
+            <a:avLst/>
+          </a:prstGeom>
+          <a:noFill/>
+          <a:ln w="19050">
+            <a:solidFill>
+              <a:schemeClr val="accent1"/>
+            </a:solidFill>
+            <a:prstDash val="dash"/>
+          </a:ln>
+        </p:spPr>
+        <p:style>
+          <a:lnRef idx="2">
+            <a:schemeClr val="accent1">
+              <a:shade val="50000"/>
+            </a:schemeClr>
+          </a:lnRef>
+          <a:fillRef idx="1">
+            <a:schemeClr val="accent1"/>
+          </a:fillRef>
+          <a:effectRef idx="0">
+            <a:schemeClr val="accent1"/>
+          </a:effectRef>
+          <a:fontRef idx="minor">
+            <a:schemeClr val="lt1"/>
+          </a:fontRef>
+        </p:style>
+        <p:txBody>
+          <a:bodyPr rtlCol="0" anchor="ctr"/>
+          <a:lstStyle/>
+          <a:p>
+            <a:pPr algn="ctr"/>
+            <a:endParaRPr lang="zh-CN" altLang="en-US" dirty="0"/>
+          </a:p>
+        </p:txBody>
+      </p:sp>
+      <p:sp>
+        <p:nvSpPr>
+          <p:cNvPr id="7" name="文本框 6"/>
+          <p:cNvSpPr txBox="1"/>
+          <p:nvPr/>
+        </p:nvSpPr>
+        <p:spPr>
+          <a:xfrm>
+            <a:off x="243796" y="610728"/>
+            <a:ext cx="3316774" cy="646331"/>
+          </a:xfrm>
+          <a:prstGeom prst="rect">
+            <a:avLst/>
+          </a:prstGeom>
+          <a:noFill/>
+        </p:spPr>
+        <p:txBody>
+          <a:bodyPr wrap="square" rtlCol="0">
+            <a:spAutoFit/>
+          </a:bodyPr>
+          <a:lstStyle/>
+          <a:p>
+            <a:r>
+              <a:rPr lang="zh-CN" altLang="en-US" dirty="0">
+                <a:solidFill>
+                  <a:srgbClr val="FF0000"/>
+                </a:solidFill>
+              </a:rPr>
+              <a:t>从系统配置中解析到的哪些</a:t>
+            </a:r>
+            <a:r>
+              <a:rPr lang="en-US" altLang="zh-CN" dirty="0">
+                <a:solidFill>
+                  <a:srgbClr val="FF0000"/>
+                </a:solidFill>
+              </a:rPr>
+              <a:t>URL</a:t>
+            </a:r>
+            <a:r>
+              <a:rPr lang="zh-CN" altLang="en-US" dirty="0">
+                <a:solidFill>
+                  <a:srgbClr val="FF0000"/>
+                </a:solidFill>
+              </a:rPr>
+              <a:t>需要哪些权限才能访问的信息</a:t>
+            </a:r>
+            <a:endParaRPr lang="zh-CN" altLang="en-US" dirty="0">
+              <a:solidFill>
+                <a:srgbClr val="FF0000"/>
+              </a:solidFill>
+            </a:endParaRPr>
+          </a:p>
+        </p:txBody>
+      </p:sp>
+      <p:sp>
+        <p:nvSpPr>
+          <p:cNvPr id="9" name="矩形 8"/>
+          <p:cNvSpPr/>
+          <p:nvPr/>
+        </p:nvSpPr>
+        <p:spPr>
+          <a:xfrm>
+            <a:off x="7820726" y="1397352"/>
+            <a:ext cx="3220761" cy="2396971"/>
+          </a:xfrm>
+          <a:prstGeom prst="rect">
+            <a:avLst/>
+          </a:prstGeom>
+          <a:noFill/>
+          <a:ln w="19050">
+            <a:solidFill>
+              <a:schemeClr val="accent1"/>
+            </a:solidFill>
+            <a:prstDash val="dash"/>
+          </a:ln>
+        </p:spPr>
+        <p:style>
+          <a:lnRef idx="2">
+            <a:schemeClr val="accent1">
+              <a:shade val="50000"/>
+            </a:schemeClr>
+          </a:lnRef>
+          <a:fillRef idx="1">
+            <a:schemeClr val="accent1"/>
+          </a:fillRef>
+          <a:effectRef idx="0">
+            <a:schemeClr val="accent1"/>
+          </a:effectRef>
+          <a:fontRef idx="minor">
+            <a:schemeClr val="lt1"/>
+          </a:fontRef>
+        </p:style>
+        <p:txBody>
+          <a:bodyPr rtlCol="0" anchor="ctr"/>
+          <a:lstStyle/>
+          <a:p>
+            <a:pPr algn="ctr"/>
+            <a:endParaRPr lang="zh-CN" altLang="en-US" dirty="0"/>
+          </a:p>
+        </p:txBody>
+      </p:sp>
+      <p:sp>
+        <p:nvSpPr>
+          <p:cNvPr id="10" name="文本框 9"/>
+          <p:cNvSpPr txBox="1"/>
+          <p:nvPr/>
+        </p:nvSpPr>
+        <p:spPr>
+          <a:xfrm>
+            <a:off x="7544435" y="610728"/>
+            <a:ext cx="4521670" cy="646331"/>
+          </a:xfrm>
+          <a:prstGeom prst="rect">
+            <a:avLst/>
+          </a:prstGeom>
+          <a:noFill/>
+        </p:spPr>
+        <p:txBody>
+          <a:bodyPr wrap="square" rtlCol="0">
+            <a:spAutoFit/>
+          </a:bodyPr>
+          <a:lstStyle/>
+          <a:p>
+            <a:r>
+              <a:rPr lang="en-US" altLang="zh-CN" dirty="0">
+                <a:solidFill>
+                  <a:srgbClr val="FF0000"/>
+                </a:solidFill>
+              </a:rPr>
+              <a:t>Authentication</a:t>
+            </a:r>
+            <a:r>
+              <a:rPr lang="zh-CN" altLang="en-US" dirty="0">
+                <a:solidFill>
+                  <a:srgbClr val="FF0000"/>
+                </a:solidFill>
+              </a:rPr>
+              <a:t>对象</a:t>
+            </a:r>
+            <a:r>
+              <a:rPr lang="en-US" altLang="zh-CN" dirty="0">
+                <a:solidFill>
+                  <a:srgbClr val="FF0000"/>
+                </a:solidFill>
+              </a:rPr>
+              <a:t>-&gt;</a:t>
+            </a:r>
+            <a:r>
+              <a:rPr lang="zh-CN" altLang="en-US" dirty="0">
+                <a:solidFill>
+                  <a:srgbClr val="FF0000"/>
+                </a:solidFill>
+              </a:rPr>
+              <a:t>里面包含当前用户</a:t>
+            </a:r>
+            <a:endParaRPr lang="en-US" altLang="zh-CN" dirty="0">
+              <a:solidFill>
+                <a:srgbClr val="FF0000"/>
+              </a:solidFill>
+            </a:endParaRPr>
+          </a:p>
+          <a:p>
+            <a:r>
+              <a:rPr lang="zh-CN" altLang="en-US" dirty="0">
+                <a:solidFill>
+                  <a:srgbClr val="FF0000"/>
+                </a:solidFill>
+              </a:rPr>
+              <a:t>究竟有哪些权限</a:t>
+            </a:r>
+            <a:endParaRPr lang="en-US" altLang="zh-CN" dirty="0">
+              <a:solidFill>
+                <a:srgbClr val="FF0000"/>
+              </a:solidFill>
+            </a:endParaRPr>
+          </a:p>
+        </p:txBody>
+      </p:sp>
+      <p:sp>
+        <p:nvSpPr>
+          <p:cNvPr id="12" name="文本框 11"/>
+          <p:cNvSpPr txBox="1"/>
+          <p:nvPr/>
+        </p:nvSpPr>
+        <p:spPr>
+          <a:xfrm>
+            <a:off x="4473090" y="2728053"/>
+            <a:ext cx="2339102" cy="523220"/>
+          </a:xfrm>
+          <a:prstGeom prst="rect">
+            <a:avLst/>
+          </a:prstGeom>
+          <a:noFill/>
+        </p:spPr>
+        <p:txBody>
+          <a:bodyPr wrap="none" rtlCol="0">
+            <a:spAutoFit/>
+          </a:bodyPr>
+          <a:lstStyle/>
+          <a:p>
+            <a:r>
+              <a:rPr lang="zh-CN" altLang="en-US" sz="1400" b="1" dirty="0">
+                <a:solidFill>
+                  <a:schemeClr val="tx1">
+                    <a:lumMod val="85000"/>
+                    <a:lumOff val="15000"/>
+                  </a:schemeClr>
+                </a:solidFill>
+              </a:rPr>
+              <a:t>通过上面三份数据判定用户</a:t>
+            </a:r>
+            <a:endParaRPr lang="en-US" altLang="zh-CN" sz="1400" b="1" dirty="0">
+              <a:solidFill>
+                <a:schemeClr val="tx1">
+                  <a:lumMod val="85000"/>
+                  <a:lumOff val="15000"/>
+                </a:schemeClr>
+              </a:solidFill>
+            </a:endParaRPr>
+          </a:p>
+          <a:p>
+            <a:r>
+              <a:rPr lang="zh-CN" altLang="en-US" sz="1400" b="1" dirty="0">
+                <a:solidFill>
+                  <a:schemeClr val="tx1">
+                    <a:lumMod val="85000"/>
+                    <a:lumOff val="15000"/>
+                  </a:schemeClr>
+                </a:solidFill>
+              </a:rPr>
+              <a:t>有没有用权限访问当前请求</a:t>
+            </a:r>
+            <a:endParaRPr lang="zh-CN" altLang="en-US" sz="1400" b="1" dirty="0">
+              <a:solidFill>
+                <a:schemeClr val="tx1">
+                  <a:lumMod val="85000"/>
+                  <a:lumOff val="15000"/>
+                </a:schemeClr>
+              </a:solidFill>
+            </a:endParaRPr>
+          </a:p>
+        </p:txBody>
+      </p:sp>
+      <p:sp>
+        <p:nvSpPr>
+          <p:cNvPr id="13" name="文本框 12"/>
+          <p:cNvSpPr txBox="1"/>
+          <p:nvPr/>
+        </p:nvSpPr>
+        <p:spPr>
+          <a:xfrm>
+            <a:off x="5640456" y="2971800"/>
+            <a:ext cx="914400" cy="914400"/>
+          </a:xfrm>
+          <a:prstGeom prst="rect">
+            <a:avLst/>
+          </a:prstGeom>
+          <a:noFill/>
+        </p:spPr>
+        <p:txBody>
+          <a:bodyPr wrap="square" rtlCol="0">
+            <a:spAutoFit/>
+          </a:bodyPr>
+          <a:lstStyle/>
+          <a:p>
+            <a:endParaRPr lang="zh-CN" altLang="en-US" dirty="0"/>
+          </a:p>
+        </p:txBody>
+      </p:sp>
+      <p:sp>
+        <p:nvSpPr>
+          <p:cNvPr id="14" name="文本框 13"/>
+          <p:cNvSpPr txBox="1"/>
+          <p:nvPr/>
+        </p:nvSpPr>
+        <p:spPr>
+          <a:xfrm>
+            <a:off x="5317289" y="3429000"/>
+            <a:ext cx="646331" cy="369332"/>
+          </a:xfrm>
+          <a:prstGeom prst="rect">
+            <a:avLst/>
+          </a:prstGeom>
+          <a:noFill/>
+        </p:spPr>
+        <p:txBody>
+          <a:bodyPr wrap="none" rtlCol="0">
+            <a:spAutoFit/>
+          </a:bodyPr>
+          <a:lstStyle/>
+          <a:p>
+            <a:r>
+              <a:rPr lang="zh-CN" altLang="en-US" b="1" dirty="0">
+                <a:solidFill>
+                  <a:srgbClr val="FF33CC"/>
+                </a:solidFill>
+              </a:rPr>
+              <a:t>接口</a:t>
+            </a:r>
+            <a:endParaRPr lang="zh-CN" altLang="en-US" b="1" dirty="0">
+              <a:solidFill>
+                <a:srgbClr val="FF33CC"/>
+              </a:solidFill>
+            </a:endParaRPr>
+          </a:p>
+        </p:txBody>
+      </p:sp>
+      <p:sp>
+        <p:nvSpPr>
+          <p:cNvPr id="15" name="文本框 14"/>
+          <p:cNvSpPr txBox="1"/>
+          <p:nvPr/>
+        </p:nvSpPr>
+        <p:spPr>
+          <a:xfrm>
+            <a:off x="3269974" y="4313583"/>
+            <a:ext cx="1415772" cy="338554"/>
+          </a:xfrm>
+          <a:prstGeom prst="rect">
+            <a:avLst/>
+          </a:prstGeom>
+          <a:noFill/>
+        </p:spPr>
+        <p:txBody>
+          <a:bodyPr wrap="none" rtlCol="0">
+            <a:spAutoFit/>
+          </a:bodyPr>
+          <a:lstStyle/>
+          <a:p>
+            <a:r>
+              <a:rPr lang="zh-CN" altLang="en-US" sz="1600" b="1" dirty="0">
+                <a:solidFill>
+                  <a:srgbClr val="FF33CC"/>
+                </a:solidFill>
+              </a:rPr>
+              <a:t>一个抽象实现</a:t>
+            </a:r>
+            <a:endParaRPr lang="zh-CN" altLang="en-US" sz="1600" b="1" dirty="0">
+              <a:solidFill>
+                <a:srgbClr val="FF33CC"/>
+              </a:solidFill>
+            </a:endParaRPr>
+          </a:p>
+        </p:txBody>
+      </p:sp>
+      <p:sp>
+        <p:nvSpPr>
+          <p:cNvPr id="16" name="文本框 15"/>
+          <p:cNvSpPr txBox="1"/>
+          <p:nvPr/>
+        </p:nvSpPr>
+        <p:spPr>
+          <a:xfrm>
+            <a:off x="2196548" y="5460647"/>
+            <a:ext cx="3672800" cy="369332"/>
+          </a:xfrm>
+          <a:prstGeom prst="rect">
+            <a:avLst/>
+          </a:prstGeom>
+          <a:noFill/>
+        </p:spPr>
+        <p:txBody>
+          <a:bodyPr wrap="none" rtlCol="0">
+            <a:spAutoFit/>
+          </a:bodyPr>
+          <a:lstStyle/>
+          <a:p>
+            <a:r>
+              <a:rPr lang="zh-CN" altLang="en-US" b="1" dirty="0">
+                <a:solidFill>
+                  <a:srgbClr val="FF33CC"/>
+                </a:solidFill>
+              </a:rPr>
+              <a:t>    三个</a:t>
+            </a:r>
+            <a:r>
+              <a:rPr lang="en-US" altLang="zh-CN" b="1" dirty="0">
+                <a:solidFill>
+                  <a:srgbClr val="FF33CC"/>
+                </a:solidFill>
+              </a:rPr>
+              <a:t>--------</a:t>
+            </a:r>
+            <a:r>
+              <a:rPr lang="zh-CN" altLang="en-US" b="1" dirty="0">
+                <a:solidFill>
+                  <a:srgbClr val="FF33CC"/>
+                </a:solidFill>
+              </a:rPr>
+              <a:t>具体</a:t>
+            </a:r>
+            <a:r>
+              <a:rPr lang="en-US" altLang="zh-CN" b="1" dirty="0">
+                <a:solidFill>
+                  <a:srgbClr val="FF33CC"/>
+                </a:solidFill>
+              </a:rPr>
+              <a:t>--------</a:t>
+            </a:r>
+            <a:r>
+              <a:rPr lang="zh-CN" altLang="en-US" b="1" dirty="0">
+                <a:solidFill>
+                  <a:srgbClr val="FF33CC"/>
+                </a:solidFill>
+              </a:rPr>
+              <a:t>实现</a:t>
+            </a:r>
+            <a:endParaRPr lang="zh-CN" altLang="en-US" b="1" dirty="0">
+              <a:solidFill>
+                <a:srgbClr val="FF33CC"/>
+              </a:solidFill>
+            </a:endParaRPr>
+          </a:p>
+        </p:txBody>
+      </p:sp>
+      <p:sp>
+        <p:nvSpPr>
+          <p:cNvPr id="2" name="文本框 1"/>
+          <p:cNvSpPr txBox="1"/>
+          <p:nvPr/>
+        </p:nvSpPr>
+        <p:spPr>
+          <a:xfrm>
+            <a:off x="7189470" y="3914775"/>
+            <a:ext cx="4483100" cy="737235"/>
+          </a:xfrm>
+          <a:prstGeom prst="rect">
+            <a:avLst/>
+          </a:prstGeom>
+          <a:noFill/>
+        </p:spPr>
+        <p:txBody>
+          <a:bodyPr wrap="none" rtlCol="0">
+            <a:spAutoFit/>
+          </a:bodyPr>
+          <a:p>
+            <a:r>
+              <a:rPr lang="zh-CN" altLang="zh-CN" sz="1400" b="1"/>
+              <a:t>通过上面三份数据按照具体的规则</a:t>
+            </a:r>
+            <a:r>
+              <a:rPr lang="en-US" altLang="zh-CN" sz="1400" b="1"/>
+              <a:t>(</a:t>
+            </a:r>
+            <a:r>
+              <a:rPr lang="zh-CN" altLang="en-US" sz="1400" b="1"/>
+              <a:t>如当前</a:t>
+            </a:r>
+            <a:r>
+              <a:rPr lang="en-US" altLang="zh-CN" sz="1400" b="1"/>
+              <a:t>URL</a:t>
+            </a:r>
+            <a:r>
+              <a:rPr lang="zh-CN" altLang="en-US" sz="1400" b="1"/>
+              <a:t>需要哪些</a:t>
+            </a:r>
+            <a:endParaRPr lang="zh-CN" altLang="en-US" sz="1400" b="1"/>
+          </a:p>
+          <a:p>
+            <a:r>
+              <a:rPr lang="zh-CN" altLang="en-US" sz="1400" b="1"/>
+              <a:t>权限才能访问、当前</a:t>
+            </a:r>
+            <a:r>
+              <a:rPr lang="en-US" altLang="zh-CN" sz="1400" b="1"/>
+              <a:t>URL</a:t>
+            </a:r>
+            <a:r>
+              <a:rPr lang="zh-CN" altLang="en-US" sz="1400" b="1"/>
+              <a:t>是否需要认证等</a:t>
+            </a:r>
+            <a:r>
+              <a:rPr lang="en-US" altLang="zh-CN" sz="1400" b="1"/>
+              <a:t>)</a:t>
+            </a:r>
+            <a:r>
+              <a:rPr lang="zh-CN" altLang="zh-CN" sz="1400" b="1"/>
+              <a:t>分别对对当前</a:t>
+            </a:r>
+            <a:endParaRPr lang="zh-CN" altLang="zh-CN" sz="1400" b="1"/>
+          </a:p>
+          <a:p>
+            <a:r>
+              <a:rPr lang="zh-CN" altLang="zh-CN" sz="1400" b="1"/>
+              <a:t>请求进行判定</a:t>
+            </a:r>
+            <a:r>
+              <a:rPr lang="en-US" altLang="zh-CN" sz="1400" b="1"/>
+              <a:t>(</a:t>
+            </a:r>
+            <a:r>
+              <a:rPr lang="zh-CN" altLang="en-US" sz="1400" b="1"/>
+              <a:t>即投票</a:t>
+            </a:r>
+            <a:r>
+              <a:rPr lang="en-US" altLang="zh-CN" sz="1400" b="1"/>
+              <a:t>)</a:t>
+            </a:r>
+            <a:endParaRPr lang="en-US" altLang="zh-CN" sz="1400" b="1"/>
+          </a:p>
+        </p:txBody>
+      </p:sp>
+      <p:sp>
+        <p:nvSpPr>
+          <p:cNvPr id="3" name="文本框 2"/>
+          <p:cNvSpPr txBox="1"/>
+          <p:nvPr/>
+        </p:nvSpPr>
+        <p:spPr>
+          <a:xfrm>
+            <a:off x="8204200" y="6134735"/>
+            <a:ext cx="3862070" cy="737235"/>
+          </a:xfrm>
+          <a:prstGeom prst="rect">
+            <a:avLst/>
+          </a:prstGeom>
+          <a:noFill/>
+        </p:spPr>
+        <p:txBody>
+          <a:bodyPr wrap="none" rtlCol="0">
+            <a:spAutoFit/>
+          </a:bodyPr>
+          <a:p>
+            <a:r>
+              <a:rPr lang="zh-CN" altLang="en-US" sz="1400" b="1"/>
+              <a:t>在</a:t>
+            </a:r>
+            <a:r>
+              <a:rPr lang="en-US" altLang="zh-CN" sz="1400" b="1"/>
+              <a:t>spring3</a:t>
+            </a:r>
+            <a:r>
+              <a:rPr lang="zh-CN" altLang="en-US" sz="1400" b="1"/>
+              <a:t>之前每一个判断规则对应一个</a:t>
+            </a:r>
+            <a:r>
+              <a:rPr lang="en-US" altLang="zh-CN" sz="1400" b="1"/>
+              <a:t>Voter,</a:t>
+            </a:r>
+            <a:endParaRPr lang="en-US" altLang="zh-CN" sz="1400" b="1"/>
+          </a:p>
+          <a:p>
+            <a:r>
+              <a:rPr lang="en-US" altLang="zh-CN" sz="1400" b="1"/>
+              <a:t>spring3</a:t>
+            </a:r>
+            <a:r>
+              <a:rPr lang="zh-CN" altLang="en-US" sz="1400" b="1"/>
+              <a:t>之后统一由</a:t>
+            </a:r>
+            <a:r>
+              <a:rPr lang="en-US" altLang="zh-CN" sz="1400" b="1"/>
+              <a:t>WebExpressionVoter(</a:t>
+            </a:r>
+            <a:r>
+              <a:rPr lang="zh-CN" altLang="en-US" sz="1400" b="1"/>
+              <a:t>利用</a:t>
+            </a:r>
+            <a:endParaRPr lang="zh-CN" altLang="en-US" sz="1400" b="1"/>
+          </a:p>
+          <a:p>
+            <a:r>
+              <a:rPr lang="zh-CN" altLang="en-US" sz="1400" b="1"/>
+              <a:t>权限表达式</a:t>
+            </a:r>
+            <a:r>
+              <a:rPr lang="en-US" altLang="zh-CN" sz="1400" b="1"/>
+              <a:t>)</a:t>
+            </a:r>
+            <a:r>
+              <a:rPr lang="zh-CN" altLang="en-US" sz="1400" b="1"/>
+              <a:t>进行投票</a:t>
+            </a:r>
+            <a:endParaRPr lang="zh-CN" altLang="en-US" sz="1400" b="1"/>
+          </a:p>
+        </p:txBody>
+      </p:sp>
+    </p:spTree>
+  </p:cSld>
+  <p:clrMapOvr>
+    <a:masterClrMapping/>
+  </p:clrMapOvr>
+</p:sld>
+</file>
+
+<file path=ppt/slides/slide13.xml><?xml version="1.0" encoding="utf-8"?>
+<p:sld xmlns:a="http://schemas.openxmlformats.org/drawingml/2006/main" xmlns:r="http://schemas.openxmlformats.org/officeDocument/2006/relationships" xmlns:p="http://schemas.openxmlformats.org/presentationml/2006/main">
+  <p:cSld>
+    <p:spTree>
+      <p:nvGrpSpPr>
+        <p:cNvPr id="1" name=""/>
+        <p:cNvGrpSpPr/>
+        <p:nvPr/>
+      </p:nvGrpSpPr>
+      <p:grpSpPr/>
+      <p:sp>
+        <p:nvSpPr>
+          <p:cNvPr id="10" name="文本框 9"/>
+          <p:cNvSpPr txBox="1"/>
+          <p:nvPr/>
+        </p:nvSpPr>
+        <p:spPr>
+          <a:xfrm>
+            <a:off x="6532245" y="5895975"/>
+            <a:ext cx="4297680" cy="645160"/>
+          </a:xfrm>
+          <a:prstGeom prst="rect">
+            <a:avLst/>
+          </a:prstGeom>
+          <a:noFill/>
+        </p:spPr>
+        <p:txBody>
+          <a:bodyPr wrap="none" rtlCol="0">
+            <a:spAutoFit/>
+          </a:bodyPr>
+          <a:p>
+            <a:pPr algn="just"/>
+            <a:r>
+              <a:rPr lang="zh-CN" altLang="en-US"/>
+              <a:t>调用到我们项目里自己写的</a:t>
+            </a:r>
+            <a:r>
+              <a:rPr lang="en-US" altLang="zh-CN"/>
+              <a:t>REST API</a:t>
+            </a:r>
+            <a:r>
+              <a:rPr lang="zh-CN" altLang="en-US"/>
+              <a:t>之前</a:t>
+            </a:r>
+            <a:endParaRPr lang="zh-CN" altLang="en-US"/>
+          </a:p>
+          <a:p>
+            <a:pPr algn="just"/>
+            <a:r>
+              <a:rPr lang="zh-CN" altLang="en-US"/>
+              <a:t>经过的最后三个过滤器</a:t>
+            </a:r>
+            <a:endParaRPr lang="zh-CN" altLang="en-US"/>
+          </a:p>
+        </p:txBody>
+      </p:sp>
+      <p:sp>
+        <p:nvSpPr>
+          <p:cNvPr id="12" name="文本框 11"/>
+          <p:cNvSpPr txBox="1"/>
+          <p:nvPr/>
+        </p:nvSpPr>
+        <p:spPr>
+          <a:xfrm>
+            <a:off x="539115" y="5728970"/>
+            <a:ext cx="4869180" cy="922020"/>
+          </a:xfrm>
+          <a:prstGeom prst="rect">
+            <a:avLst/>
+          </a:prstGeom>
+          <a:noFill/>
+        </p:spPr>
+        <p:txBody>
+          <a:bodyPr wrap="none" rtlCol="0">
+            <a:spAutoFit/>
+          </a:bodyPr>
+          <a:p>
+            <a:pPr algn="just"/>
+            <a:r>
+              <a:rPr lang="zh-CN" altLang="en-US"/>
+              <a:t>用户名</a:t>
+            </a:r>
+            <a:r>
+              <a:rPr lang="en-US" altLang="zh-CN"/>
+              <a:t>+</a:t>
+            </a:r>
+            <a:r>
+              <a:rPr lang="zh-CN" altLang="en-US"/>
+              <a:t>密码登陆、手机短信登陆、社交登陆等</a:t>
+            </a:r>
+            <a:endParaRPr lang="zh-CN" altLang="en-US"/>
+          </a:p>
+          <a:p>
+            <a:pPr algn="just"/>
+            <a:r>
+              <a:rPr lang="zh-CN" altLang="en-US"/>
+              <a:t>使用的过滤器</a:t>
+            </a:r>
+            <a:r>
+              <a:rPr lang="en-US" altLang="zh-CN"/>
+              <a:t>,</a:t>
+            </a:r>
+            <a:r>
+              <a:rPr lang="zh-CN" altLang="en-US"/>
+              <a:t>如果认证成功会生成一个标识为</a:t>
+            </a:r>
+            <a:endParaRPr lang="zh-CN" altLang="en-US"/>
+          </a:p>
+          <a:p>
+            <a:pPr algn="just"/>
+            <a:r>
+              <a:rPr lang="zh-CN" altLang="en-US"/>
+              <a:t>认证成功的</a:t>
+            </a:r>
+            <a:r>
+              <a:rPr lang="en-US" altLang="zh-CN"/>
+              <a:t>Authentication</a:t>
+            </a:r>
+            <a:r>
+              <a:rPr lang="zh-CN" altLang="en-US"/>
+              <a:t>对象</a:t>
+            </a:r>
+            <a:endParaRPr lang="zh-CN" altLang="en-US"/>
+          </a:p>
+        </p:txBody>
+      </p:sp>
+      <p:pic>
+        <p:nvPicPr>
+          <p:cNvPr id="15" name="图片 14"/>
+          <p:cNvPicPr>
+            <a:picLocks noChangeAspect="1"/>
+          </p:cNvPicPr>
+          <p:nvPr/>
+        </p:nvPicPr>
+        <p:blipFill>
+          <a:blip r:embed="rId1"/>
+          <a:stretch>
+            <a:fillRect/>
+          </a:stretch>
+        </p:blipFill>
+        <p:spPr>
+          <a:xfrm>
+            <a:off x="67310" y="2199640"/>
+            <a:ext cx="11979910" cy="3253740"/>
+          </a:xfrm>
+          <a:prstGeom prst="rect">
+            <a:avLst/>
+          </a:prstGeom>
+        </p:spPr>
+      </p:pic>
+      <p:sp>
+        <p:nvSpPr>
+          <p:cNvPr id="16" name="文本框 15"/>
+          <p:cNvSpPr txBox="1"/>
+          <p:nvPr/>
+        </p:nvSpPr>
+        <p:spPr>
+          <a:xfrm>
+            <a:off x="10686415" y="2572385"/>
+            <a:ext cx="1183005" cy="922020"/>
+          </a:xfrm>
+          <a:prstGeom prst="rect">
+            <a:avLst/>
+          </a:prstGeom>
+          <a:noFill/>
+        </p:spPr>
+        <p:txBody>
+          <a:bodyPr wrap="square" rtlCol="0">
+            <a:spAutoFit/>
+          </a:bodyPr>
+          <a:p>
+            <a:r>
+              <a:rPr lang="zh-CN" altLang="en-US"/>
+              <a:t>我们项目里自己写的接口</a:t>
+            </a:r>
+            <a:endParaRPr lang="zh-CN" altLang="en-US"/>
+          </a:p>
+        </p:txBody>
+      </p:sp>
+      <p:cxnSp>
+        <p:nvCxnSpPr>
+          <p:cNvPr id="17" name="直接箭头连接符 16"/>
+          <p:cNvCxnSpPr/>
+          <p:nvPr/>
+        </p:nvCxnSpPr>
+        <p:spPr>
+          <a:xfrm flipV="1">
+            <a:off x="2860675" y="4775200"/>
+            <a:ext cx="265430" cy="953770"/>
+          </a:xfrm>
+          <a:prstGeom prst="straightConnector1">
+            <a:avLst/>
+          </a:prstGeom>
+          <a:ln>
+            <a:tailEnd type="arrow"/>
+          </a:ln>
+        </p:spPr>
+        <p:style>
+          <a:lnRef idx="1">
+            <a:schemeClr val="accent1"/>
+          </a:lnRef>
+          <a:fillRef idx="0">
+            <a:schemeClr val="accent1"/>
+          </a:fillRef>
+          <a:effectRef idx="0">
+            <a:schemeClr val="accent1"/>
+          </a:effectRef>
+          <a:fontRef idx="minor">
+            <a:schemeClr val="tx1"/>
+          </a:fontRef>
+        </p:style>
+      </p:cxnSp>
+      <p:cxnSp>
+        <p:nvCxnSpPr>
+          <p:cNvPr id="18" name="直接箭头连接符 17"/>
+          <p:cNvCxnSpPr/>
+          <p:nvPr/>
+        </p:nvCxnSpPr>
+        <p:spPr>
+          <a:xfrm flipH="1" flipV="1">
+            <a:off x="7034530" y="4805045"/>
+            <a:ext cx="619125" cy="1071245"/>
+          </a:xfrm>
+          <a:prstGeom prst="straightConnector1">
+            <a:avLst/>
+          </a:prstGeom>
+          <a:ln>
+            <a:tailEnd type="arrow"/>
+          </a:ln>
+        </p:spPr>
+        <p:style>
+          <a:lnRef idx="1">
+            <a:schemeClr val="accent1"/>
+          </a:lnRef>
+          <a:fillRef idx="0">
+            <a:schemeClr val="accent1"/>
+          </a:fillRef>
+          <a:effectRef idx="0">
+            <a:schemeClr val="accent1"/>
+          </a:effectRef>
+          <a:fontRef idx="minor">
+            <a:schemeClr val="tx1"/>
+          </a:fontRef>
+        </p:style>
+      </p:cxnSp>
+      <p:cxnSp>
+        <p:nvCxnSpPr>
+          <p:cNvPr id="19" name="直接箭头连接符 18"/>
+          <p:cNvCxnSpPr/>
+          <p:nvPr/>
+        </p:nvCxnSpPr>
+        <p:spPr>
+          <a:xfrm flipV="1">
+            <a:off x="7673340" y="4824730"/>
+            <a:ext cx="541020" cy="1031875"/>
+          </a:xfrm>
+          <a:prstGeom prst="straightConnector1">
+            <a:avLst/>
+          </a:prstGeom>
+          <a:ln>
+            <a:tailEnd type="arrow"/>
+          </a:ln>
+        </p:spPr>
+        <p:style>
+          <a:lnRef idx="1">
+            <a:schemeClr val="accent1"/>
+          </a:lnRef>
+          <a:fillRef idx="0">
+            <a:schemeClr val="accent1"/>
+          </a:fillRef>
+          <a:effectRef idx="0">
+            <a:schemeClr val="accent1"/>
+          </a:effectRef>
+          <a:fontRef idx="minor">
+            <a:schemeClr val="tx1"/>
+          </a:fontRef>
+        </p:style>
+      </p:cxnSp>
+      <p:cxnSp>
+        <p:nvCxnSpPr>
+          <p:cNvPr id="20" name="直接箭头连接符 19"/>
+          <p:cNvCxnSpPr/>
+          <p:nvPr/>
+        </p:nvCxnSpPr>
+        <p:spPr>
+          <a:xfrm flipV="1">
+            <a:off x="7693025" y="4814570"/>
+            <a:ext cx="1848485" cy="1081405"/>
+          </a:xfrm>
+          <a:prstGeom prst="straightConnector1">
+            <a:avLst/>
+          </a:prstGeom>
+          <a:ln>
+            <a:tailEnd type="arrow"/>
+          </a:ln>
+        </p:spPr>
+        <p:style>
+          <a:lnRef idx="1">
+            <a:schemeClr val="accent1"/>
+          </a:lnRef>
+          <a:fillRef idx="0">
+            <a:schemeClr val="accent1"/>
+          </a:fillRef>
+          <a:effectRef idx="0">
+            <a:schemeClr val="accent1"/>
+          </a:effectRef>
+          <a:fontRef idx="minor">
+            <a:schemeClr val="tx1"/>
+          </a:fontRef>
+        </p:style>
+      </p:cxnSp>
+      <p:cxnSp>
+        <p:nvCxnSpPr>
+          <p:cNvPr id="21" name="直接箭头连接符 20"/>
+          <p:cNvCxnSpPr/>
+          <p:nvPr/>
+        </p:nvCxnSpPr>
+        <p:spPr>
+          <a:xfrm flipH="1" flipV="1">
+            <a:off x="6460490" y="2209165"/>
+            <a:ext cx="136525" cy="432435"/>
+          </a:xfrm>
+          <a:prstGeom prst="straightConnector1">
+            <a:avLst/>
+          </a:prstGeom>
+          <a:ln>
+            <a:tailEnd type="arrow"/>
+          </a:ln>
+        </p:spPr>
+        <p:style>
+          <a:lnRef idx="1">
+            <a:schemeClr val="accent1"/>
+          </a:lnRef>
+          <a:fillRef idx="0">
+            <a:schemeClr val="accent1"/>
+          </a:fillRef>
+          <a:effectRef idx="0">
+            <a:schemeClr val="accent1"/>
+          </a:effectRef>
+          <a:fontRef idx="minor">
+            <a:schemeClr val="tx1"/>
+          </a:fontRef>
+        </p:style>
+      </p:cxnSp>
+      <p:cxnSp>
+        <p:nvCxnSpPr>
+          <p:cNvPr id="22" name="直接箭头连接符 21"/>
+          <p:cNvCxnSpPr/>
+          <p:nvPr/>
+        </p:nvCxnSpPr>
+        <p:spPr>
+          <a:xfrm flipH="1" flipV="1">
+            <a:off x="1415415" y="1835150"/>
+            <a:ext cx="78740" cy="777240"/>
+          </a:xfrm>
+          <a:prstGeom prst="straightConnector1">
+            <a:avLst/>
+          </a:prstGeom>
+          <a:ln>
+            <a:tailEnd type="arrow"/>
+          </a:ln>
+        </p:spPr>
+        <p:style>
+          <a:lnRef idx="1">
+            <a:schemeClr val="accent1"/>
+          </a:lnRef>
+          <a:fillRef idx="0">
+            <a:schemeClr val="accent1"/>
+          </a:fillRef>
+          <a:effectRef idx="0">
+            <a:schemeClr val="accent1"/>
+          </a:effectRef>
+          <a:fontRef idx="minor">
+            <a:schemeClr val="tx1"/>
+          </a:fontRef>
+        </p:style>
+      </p:cxnSp>
+      <p:sp>
+        <p:nvSpPr>
+          <p:cNvPr id="23" name="文本框 22"/>
+          <p:cNvSpPr txBox="1"/>
+          <p:nvPr/>
+        </p:nvSpPr>
+        <p:spPr>
+          <a:xfrm>
+            <a:off x="147320" y="330835"/>
+            <a:ext cx="3895090" cy="1753235"/>
+          </a:xfrm>
+          <a:prstGeom prst="rect">
+            <a:avLst/>
+          </a:prstGeom>
+          <a:noFill/>
+        </p:spPr>
+        <p:txBody>
+          <a:bodyPr wrap="square" rtlCol="0">
+            <a:spAutoFit/>
+          </a:bodyPr>
+          <a:p>
+            <a:pPr algn="just"/>
+            <a:r>
+              <a:rPr lang="en-US" altLang="zh-CN"/>
+              <a:t>spring security</a:t>
+            </a:r>
+            <a:r>
+              <a:rPr lang="zh-CN" altLang="en-US">
+                <a:solidFill>
+                  <a:srgbClr val="FF0000"/>
+                </a:solidFill>
+              </a:rPr>
+              <a:t>第一个过滤器</a:t>
+            </a:r>
+            <a:r>
+              <a:rPr lang="zh-CN" altLang="en-US"/>
+              <a:t>。请求进来时</a:t>
+            </a:r>
+            <a:r>
+              <a:rPr lang="en-US" altLang="zh-CN"/>
+              <a:t>,检查session,</a:t>
+            </a:r>
+            <a:r>
+              <a:rPr lang="zh-CN" altLang="en-US"/>
+              <a:t>如果有认证成功的</a:t>
+            </a:r>
+            <a:r>
+              <a:rPr lang="en-US" altLang="zh-CN"/>
+              <a:t>Authentication</a:t>
+            </a:r>
+            <a:r>
+              <a:rPr lang="zh-CN" altLang="en-US"/>
+              <a:t>对象</a:t>
+            </a:r>
+            <a:r>
+              <a:rPr lang="en-US" altLang="zh-CN"/>
+              <a:t>,</a:t>
+            </a:r>
+            <a:r>
+              <a:rPr lang="zh-CN" altLang="en-US"/>
+              <a:t>则放到线程里</a:t>
+            </a:r>
+            <a:r>
+              <a:rPr lang="en-US" altLang="zh-CN"/>
+              <a:t>,</a:t>
+            </a:r>
+            <a:r>
+              <a:rPr lang="zh-CN" altLang="en-US"/>
+              <a:t>出去时如果有则放到</a:t>
+            </a:r>
+            <a:r>
+              <a:rPr lang="en-US" altLang="zh-CN"/>
+              <a:t>session</a:t>
+            </a:r>
+            <a:r>
+              <a:rPr lang="zh-CN" altLang="en-US"/>
+              <a:t>里</a:t>
+            </a:r>
+            <a:r>
+              <a:rPr lang="en-US" altLang="zh-CN"/>
+              <a:t>--&gt;</a:t>
+            </a:r>
+            <a:r>
+              <a:rPr lang="zh-CN" altLang="en-US">
+                <a:solidFill>
+                  <a:srgbClr val="FF0000"/>
+                </a:solidFill>
+              </a:rPr>
+              <a:t>从而实现认证信息在多个请求中共享。</a:t>
+            </a:r>
+            <a:endParaRPr lang="zh-CN" altLang="en-US">
+              <a:solidFill>
+                <a:srgbClr val="FF0000"/>
+              </a:solidFill>
+            </a:endParaRPr>
+          </a:p>
+        </p:txBody>
+      </p:sp>
+      <p:sp>
+        <p:nvSpPr>
+          <p:cNvPr id="24" name="文本框 23"/>
+          <p:cNvSpPr txBox="1"/>
+          <p:nvPr/>
+        </p:nvSpPr>
+        <p:spPr>
+          <a:xfrm>
+            <a:off x="4210050" y="57150"/>
+            <a:ext cx="4495165" cy="2306955"/>
+          </a:xfrm>
+          <a:prstGeom prst="rect">
+            <a:avLst/>
+          </a:prstGeom>
+          <a:noFill/>
+        </p:spPr>
+        <p:txBody>
+          <a:bodyPr wrap="square" rtlCol="0">
+            <a:spAutoFit/>
+          </a:bodyPr>
+          <a:p>
+            <a:pPr algn="just"/>
+            <a:r>
+              <a:rPr lang="zh-CN" altLang="en-US"/>
+              <a:t>如果前面的认证都没有成功</a:t>
+            </a:r>
+            <a:r>
+              <a:rPr lang="en-US" altLang="zh-CN"/>
+              <a:t>,</a:t>
+            </a:r>
+            <a:r>
+              <a:rPr lang="zh-CN" altLang="en-US"/>
+              <a:t>经过该过滤器时</a:t>
+            </a:r>
+            <a:r>
+              <a:rPr lang="en-US" altLang="zh-CN"/>
+              <a:t>,spring security</a:t>
+            </a:r>
+            <a:r>
+              <a:rPr lang="zh-CN" altLang="en-US"/>
+              <a:t>会创建一个匿名的</a:t>
+            </a:r>
+            <a:r>
+              <a:rPr lang="en-US" altLang="zh-CN"/>
+              <a:t>Authentication</a:t>
+            </a:r>
+            <a:r>
+              <a:rPr lang="zh-CN" altLang="en-US"/>
+              <a:t>对象</a:t>
+            </a:r>
+            <a:r>
+              <a:rPr lang="en-US" altLang="zh-CN"/>
+              <a:t>,</a:t>
+            </a:r>
+            <a:r>
+              <a:rPr lang="zh-CN" altLang="en-US"/>
+              <a:t>这样在之后的过滤器里看到线程里的</a:t>
+            </a:r>
+            <a:r>
+              <a:rPr lang="en-US" altLang="zh-CN"/>
+              <a:t>Authentication</a:t>
+            </a:r>
+            <a:r>
+              <a:rPr lang="zh-CN" altLang="en-US"/>
+              <a:t>对象为该类型的对象时</a:t>
+            </a:r>
+            <a:r>
+              <a:rPr lang="en-US" altLang="zh-CN"/>
+              <a:t>,</a:t>
+            </a:r>
+            <a:r>
+              <a:rPr lang="zh-CN" altLang="en-US"/>
+              <a:t>就知道没有认证成功了。这里应该注意</a:t>
+            </a:r>
+            <a:r>
+              <a:rPr lang="en-US" altLang="zh-CN"/>
+              <a:t>:</a:t>
+            </a:r>
+            <a:r>
+              <a:rPr lang="zh-CN" altLang="en-US"/>
+              <a:t>因为有了这个操作</a:t>
+            </a:r>
+            <a:r>
+              <a:rPr lang="en-US" altLang="zh-CN"/>
+              <a:t>,</a:t>
+            </a:r>
+            <a:r>
+              <a:rPr lang="zh-CN" altLang="en-US"/>
+              <a:t>所以</a:t>
+            </a:r>
+            <a:r>
+              <a:rPr lang="zh-CN" altLang="en-US">
+                <a:solidFill>
+                  <a:srgbClr val="FF33CC"/>
+                </a:solidFill>
+              </a:rPr>
+              <a:t>后面的过滤器里肯定能从线程里找到一个</a:t>
+            </a:r>
+            <a:r>
+              <a:rPr lang="en-US" altLang="zh-CN">
+                <a:solidFill>
+                  <a:srgbClr val="FF33CC"/>
+                </a:solidFill>
+              </a:rPr>
+              <a:t>Authentication</a:t>
+            </a:r>
+            <a:r>
+              <a:rPr lang="zh-CN" altLang="en-US">
+                <a:solidFill>
+                  <a:srgbClr val="FF33CC"/>
+                </a:solidFill>
+              </a:rPr>
+              <a:t>对象。</a:t>
+            </a:r>
+            <a:endParaRPr lang="zh-CN" altLang="en-US">
+              <a:solidFill>
+                <a:srgbClr val="FF33CC"/>
+              </a:solidFill>
+            </a:endParaRPr>
+          </a:p>
+        </p:txBody>
+      </p:sp>
+      <p:cxnSp>
+        <p:nvCxnSpPr>
+          <p:cNvPr id="25" name="直接箭头连接符 24"/>
+          <p:cNvCxnSpPr/>
+          <p:nvPr/>
+        </p:nvCxnSpPr>
+        <p:spPr>
+          <a:xfrm flipV="1">
+            <a:off x="9832975" y="2248535"/>
+            <a:ext cx="118110" cy="403225"/>
+          </a:xfrm>
+          <a:prstGeom prst="straightConnector1">
+            <a:avLst/>
+          </a:prstGeom>
+          <a:ln>
+            <a:tailEnd type="arrow"/>
+          </a:ln>
+        </p:spPr>
+        <p:style>
+          <a:lnRef idx="1">
+            <a:schemeClr val="accent1"/>
+          </a:lnRef>
+          <a:fillRef idx="0">
+            <a:schemeClr val="accent1"/>
+          </a:fillRef>
+          <a:effectRef idx="0">
+            <a:schemeClr val="accent1"/>
+          </a:effectRef>
+          <a:fontRef idx="minor">
+            <a:schemeClr val="tx1"/>
+          </a:fontRef>
+        </p:style>
+      </p:cxnSp>
+      <p:cxnSp>
+        <p:nvCxnSpPr>
+          <p:cNvPr id="26" name="直接箭头连接符 25"/>
+          <p:cNvCxnSpPr/>
+          <p:nvPr/>
+        </p:nvCxnSpPr>
+        <p:spPr>
+          <a:xfrm flipV="1">
+            <a:off x="8810625" y="2228850"/>
+            <a:ext cx="501015" cy="412750"/>
+          </a:xfrm>
+          <a:prstGeom prst="straightConnector1">
+            <a:avLst/>
+          </a:prstGeom>
+          <a:ln>
+            <a:tailEnd type="arrow"/>
+          </a:ln>
+        </p:spPr>
+        <p:style>
+          <a:lnRef idx="1">
+            <a:schemeClr val="accent1"/>
+          </a:lnRef>
+          <a:fillRef idx="0">
+            <a:schemeClr val="accent1"/>
+          </a:fillRef>
+          <a:effectRef idx="0">
+            <a:schemeClr val="accent1"/>
+          </a:effectRef>
+          <a:fontRef idx="minor">
+            <a:schemeClr val="tx1"/>
+          </a:fontRef>
+        </p:style>
+      </p:cxnSp>
+      <p:sp>
+        <p:nvSpPr>
+          <p:cNvPr id="27" name="文本框 26"/>
+          <p:cNvSpPr txBox="1"/>
+          <p:nvPr/>
+        </p:nvSpPr>
+        <p:spPr>
+          <a:xfrm>
+            <a:off x="9015730" y="57150"/>
+            <a:ext cx="3031490" cy="2306955"/>
+          </a:xfrm>
+          <a:prstGeom prst="rect">
+            <a:avLst/>
+          </a:prstGeom>
+          <a:noFill/>
+        </p:spPr>
+        <p:txBody>
+          <a:bodyPr wrap="square" rtlCol="0">
+            <a:spAutoFit/>
+          </a:bodyPr>
+          <a:p>
+            <a:pPr algn="just"/>
+            <a:r>
+              <a:rPr lang="zh-CN" altLang="en-US"/>
+              <a:t>拿到前面的</a:t>
+            </a:r>
+            <a:r>
+              <a:rPr lang="en-US" altLang="zh-CN"/>
+              <a:t>Authentication</a:t>
+            </a:r>
+            <a:r>
+              <a:rPr lang="zh-CN" altLang="en-US"/>
+              <a:t>后进入到最后一个过滤器</a:t>
+            </a:r>
+            <a:r>
+              <a:rPr lang="en-US" altLang="zh-CN"/>
+              <a:t>,</a:t>
+            </a:r>
+            <a:r>
+              <a:rPr lang="zh-CN" altLang="en-US"/>
+              <a:t>进行权限校验</a:t>
+            </a:r>
+            <a:r>
+              <a:rPr lang="en-US" altLang="zh-CN"/>
+              <a:t>,</a:t>
+            </a:r>
+            <a:r>
+              <a:rPr lang="zh-CN" altLang="en-US"/>
+              <a:t>如果校验成功就可以访问到我们的</a:t>
+            </a:r>
+            <a:r>
+              <a:rPr lang="en-US" altLang="zh-CN"/>
+              <a:t>API</a:t>
+            </a:r>
+            <a:r>
+              <a:rPr lang="zh-CN" altLang="en-US"/>
+              <a:t>了</a:t>
+            </a:r>
+            <a:r>
+              <a:rPr lang="en-US" altLang="zh-CN"/>
+              <a:t>,</a:t>
+            </a:r>
+            <a:r>
+              <a:rPr lang="zh-CN" altLang="en-US"/>
+              <a:t>如果失败会抛出异常</a:t>
+            </a:r>
+            <a:r>
+              <a:rPr lang="en-US" altLang="zh-CN"/>
+              <a:t>,</a:t>
+            </a:r>
+            <a:r>
+              <a:rPr lang="zh-CN" altLang="en-US"/>
+              <a:t>最终异常都会被倒数第二个过虑器抓到</a:t>
+            </a:r>
+            <a:r>
+              <a:rPr lang="en-US" altLang="zh-CN"/>
+              <a:t>,</a:t>
+            </a:r>
+            <a:r>
+              <a:rPr lang="zh-CN" altLang="en-US"/>
+              <a:t>然后按照抓到的异常进行相应的处理。</a:t>
+            </a:r>
+            <a:endParaRPr lang="en-US" altLang="zh-CN"/>
           </a:p>
         </p:txBody>
       </p:sp>

</xml_diff>